<commit_message>
adding new discussion slices
</commit_message>
<xml_diff>
--- a/presentation/fianl_presentation.pptx
+++ b/presentation/fianl_presentation.pptx
@@ -5,29 +5,28 @@
     <p:sldMasterId id="2147483648" r:id="rId1"/>
   </p:sldMasterIdLst>
   <p:notesMasterIdLst>
-    <p:notesMasterId r:id="rId23"/>
+    <p:notesMasterId r:id="rId22"/>
   </p:notesMasterIdLst>
   <p:sldIdLst>
     <p:sldId id="290" r:id="rId3"/>
     <p:sldId id="295" r:id="rId4"/>
-    <p:sldId id="291" r:id="rId5"/>
-    <p:sldId id="292" r:id="rId6"/>
+    <p:sldId id="292" r:id="rId5"/>
+    <p:sldId id="293" r:id="rId6"/>
     <p:sldId id="294" r:id="rId7"/>
-    <p:sldId id="293" r:id="rId8"/>
-    <p:sldId id="296" r:id="rId9"/>
-    <p:sldId id="297" r:id="rId10"/>
-    <p:sldId id="298" r:id="rId11"/>
-    <p:sldId id="299" r:id="rId12"/>
-    <p:sldId id="300" r:id="rId13"/>
-    <p:sldId id="301" r:id="rId14"/>
-    <p:sldId id="307" r:id="rId15"/>
-    <p:sldId id="308" r:id="rId16"/>
-    <p:sldId id="309" r:id="rId17"/>
-    <p:sldId id="310" r:id="rId18"/>
-    <p:sldId id="311" r:id="rId19"/>
-    <p:sldId id="312" r:id="rId20"/>
-    <p:sldId id="313" r:id="rId21"/>
-    <p:sldId id="314" r:id="rId22"/>
+    <p:sldId id="296" r:id="rId8"/>
+    <p:sldId id="297" r:id="rId9"/>
+    <p:sldId id="298" r:id="rId10"/>
+    <p:sldId id="299" r:id="rId11"/>
+    <p:sldId id="300" r:id="rId12"/>
+    <p:sldId id="301" r:id="rId13"/>
+    <p:sldId id="307" r:id="rId14"/>
+    <p:sldId id="308" r:id="rId15"/>
+    <p:sldId id="309" r:id="rId16"/>
+    <p:sldId id="310" r:id="rId17"/>
+    <p:sldId id="311" r:id="rId18"/>
+    <p:sldId id="312" r:id="rId19"/>
+    <p:sldId id="313" r:id="rId20"/>
+    <p:sldId id="314" r:id="rId21"/>
   </p:sldIdLst>
   <p:sldSz cx="12192000" cy="6858000"/>
   <p:notesSz cx="6858000" cy="9144000"/>
@@ -3127,7 +3126,7 @@
         <a:spcBef>
           <a:spcPts val="1000"/>
         </a:spcBef>
-        <a:buFont typeface="Arial" panose="020B0604020202020204" pitchFamily="34" charset="0"/>
+        <a:buFont typeface="Arial" panose="02080604020202020204" pitchFamily="34" charset="0"/>
         <a:buChar char="•"/>
         <a:defRPr sz="2800" kern="1200">
           <a:solidFill>
@@ -3145,7 +3144,7 @@
         <a:spcBef>
           <a:spcPts val="500"/>
         </a:spcBef>
-        <a:buFont typeface="Arial" panose="020B0604020202020204" pitchFamily="34" charset="0"/>
+        <a:buFont typeface="Arial" panose="02080604020202020204" pitchFamily="34" charset="0"/>
         <a:buChar char="•"/>
         <a:defRPr sz="2400" kern="1200">
           <a:solidFill>
@@ -3163,7 +3162,7 @@
         <a:spcBef>
           <a:spcPts val="500"/>
         </a:spcBef>
-        <a:buFont typeface="Arial" panose="020B0604020202020204" pitchFamily="34" charset="0"/>
+        <a:buFont typeface="Arial" panose="02080604020202020204" pitchFamily="34" charset="0"/>
         <a:buChar char="•"/>
         <a:defRPr sz="2000" kern="1200">
           <a:solidFill>
@@ -3181,7 +3180,7 @@
         <a:spcBef>
           <a:spcPts val="500"/>
         </a:spcBef>
-        <a:buFont typeface="Arial" panose="020B0604020202020204" pitchFamily="34" charset="0"/>
+        <a:buFont typeface="Arial" panose="02080604020202020204" pitchFamily="34" charset="0"/>
         <a:buChar char="•"/>
         <a:defRPr sz="1800" kern="1200">
           <a:solidFill>
@@ -3199,7 +3198,7 @@
         <a:spcBef>
           <a:spcPts val="500"/>
         </a:spcBef>
-        <a:buFont typeface="Arial" panose="020B0604020202020204" pitchFamily="34" charset="0"/>
+        <a:buFont typeface="Arial" panose="02080604020202020204" pitchFamily="34" charset="0"/>
         <a:buChar char="•"/>
         <a:defRPr sz="1800" kern="1200">
           <a:solidFill>
@@ -3217,7 +3216,7 @@
         <a:spcBef>
           <a:spcPts val="500"/>
         </a:spcBef>
-        <a:buFont typeface="Arial" panose="020B0604020202020204" pitchFamily="34" charset="0"/>
+        <a:buFont typeface="Arial" panose="02080604020202020204" pitchFamily="34" charset="0"/>
         <a:buChar char="•"/>
         <a:defRPr sz="1800" kern="1200">
           <a:solidFill>
@@ -3235,7 +3234,7 @@
         <a:spcBef>
           <a:spcPts val="500"/>
         </a:spcBef>
-        <a:buFont typeface="Arial" panose="020B0604020202020204" pitchFamily="34" charset="0"/>
+        <a:buFont typeface="Arial" panose="02080604020202020204" pitchFamily="34" charset="0"/>
         <a:buChar char="•"/>
         <a:defRPr sz="1800" kern="1200">
           <a:solidFill>
@@ -3253,7 +3252,7 @@
         <a:spcBef>
           <a:spcPts val="500"/>
         </a:spcBef>
-        <a:buFont typeface="Arial" panose="020B0604020202020204" pitchFamily="34" charset="0"/>
+        <a:buFont typeface="Arial" panose="02080604020202020204" pitchFamily="34" charset="0"/>
         <a:buChar char="•"/>
         <a:defRPr sz="1800" kern="1200">
           <a:solidFill>
@@ -3271,7 +3270,7 @@
         <a:spcBef>
           <a:spcPts val="500"/>
         </a:spcBef>
-        <a:buFont typeface="Arial" panose="020B0604020202020204" pitchFamily="34" charset="0"/>
+        <a:buFont typeface="Arial" panose="02080604020202020204" pitchFamily="34" charset="0"/>
         <a:buChar char="•"/>
         <a:defRPr sz="1800" kern="1200">
           <a:solidFill>
@@ -3400,8 +3399,8 @@
         </p:nvSpPr>
         <p:spPr>
           <a:xfrm>
-            <a:off x="1146175" y="2644775"/>
-            <a:ext cx="9899015" cy="1568450"/>
+            <a:off x="655955" y="2644775"/>
+            <a:ext cx="10765155" cy="1568450"/>
           </a:xfrm>
           <a:prstGeom prst="rect">
             <a:avLst/>
@@ -3416,7 +3415,23 @@
             <a:pPr algn="ctr"/>
             <a:r>
               <a:rPr lang="" altLang="en-US" sz="4800"/>
-              <a:t>Analyzing different run numbers from COMPASS datasets  </a:t>
+              <a:t>Comparing </a:t>
+            </a:r>
+            <a:r>
+              <a:rPr lang="en-US" altLang="en-US" sz="4800"/>
+              <a:t>different runs from </a:t>
+            </a:r>
+            <a:r>
+              <a:rPr lang="" altLang="en-US" sz="4800"/>
+              <a:t>the 2008 </a:t>
+            </a:r>
+            <a:r>
+              <a:rPr lang="en-US" altLang="en-US" sz="4800"/>
+              <a:t>COMPASS </a:t>
+            </a:r>
+            <a:r>
+              <a:rPr lang="" altLang="en-US" sz="4800"/>
+              <a:t>data</a:t>
             </a:r>
             <a:endParaRPr lang="" altLang="en-US" sz="4800"/>
           </a:p>
@@ -3444,10 +3459,10 @@
           </a:bodyPr>
           <a:p>
             <a:r>
-              <a:rPr lang="" altLang="en-US"/>
+              <a:rPr lang="en-US" altLang="en-US"/>
               <a:t>Yanzhao Wang</a:t>
             </a:r>
-            <a:endParaRPr lang="" altLang="en-US"/>
+            <a:endParaRPr lang="en-US" altLang="en-US"/>
           </a:p>
         </p:txBody>
       </p:sp>
@@ -3524,7 +3539,7 @@
         <p:spPr>
           <a:xfrm>
             <a:off x="332740" y="135255"/>
-            <a:ext cx="6003925" cy="645160"/>
+            <a:ext cx="7367270" cy="645160"/>
           </a:xfrm>
           <a:prstGeom prst="rect">
             <a:avLst/>
@@ -3540,7 +3555,7 @@
               <a:rPr lang="en-US" altLang="en-US" sz="3600">
                 <a:sym typeface="+mn-ea"/>
               </a:rPr>
-              <a:t>The total invariant mass</a:t>
+              <a:t>Invariant mass of three pions</a:t>
             </a:r>
             <a:endParaRPr lang="en-US" altLang="en-US" sz="3600"/>
           </a:p>
@@ -3598,7 +3613,7 @@
         <p:spPr>
           <a:xfrm>
             <a:off x="332740" y="135255"/>
-            <a:ext cx="7367270" cy="645160"/>
+            <a:ext cx="10940415" cy="645160"/>
           </a:xfrm>
           <a:prstGeom prst="rect">
             <a:avLst/>
@@ -3614,7 +3629,7 @@
               <a:rPr lang="en-US" altLang="en-US" sz="3600">
                 <a:sym typeface="+mn-ea"/>
               </a:rPr>
-              <a:t>Invariant mass of three pions</a:t>
+              <a:t>Photon number from different Calorimeters</a:t>
             </a:r>
             <a:endParaRPr lang="en-US" altLang="en-US" sz="3600"/>
           </a:p>
@@ -3672,7 +3687,7 @@
         <p:spPr>
           <a:xfrm>
             <a:off x="332740" y="135255"/>
-            <a:ext cx="9942830" cy="645160"/>
+            <a:ext cx="10652760" cy="645160"/>
           </a:xfrm>
           <a:prstGeom prst="rect">
             <a:avLst/>
@@ -3746,7 +3761,7 @@
         <p:spPr>
           <a:xfrm>
             <a:off x="332740" y="135255"/>
-            <a:ext cx="9873615" cy="645160"/>
+            <a:ext cx="4641215" cy="645160"/>
           </a:xfrm>
           <a:prstGeom prst="rect">
             <a:avLst/>
@@ -3762,7 +3777,7 @@
               <a:rPr lang="en-US" altLang="en-US" sz="3600">
                 <a:sym typeface="+mn-ea"/>
               </a:rPr>
-              <a:t>Photon number from different Calorimeters</a:t>
+              <a:t>Position of Vertices</a:t>
             </a:r>
             <a:endParaRPr lang="en-US" altLang="en-US" sz="3600"/>
           </a:p>
@@ -3894,7 +3909,7 @@
         <p:spPr>
           <a:xfrm>
             <a:off x="332740" y="135255"/>
-            <a:ext cx="4641215" cy="645160"/>
+            <a:ext cx="9116695" cy="645160"/>
           </a:xfrm>
           <a:prstGeom prst="rect">
             <a:avLst/>
@@ -3910,7 +3925,7 @@
               <a:rPr lang="en-US" altLang="en-US" sz="3600">
                 <a:sym typeface="+mn-ea"/>
               </a:rPr>
-              <a:t>Position of Vertices</a:t>
+              <a:t>The momentum magnitude of beam</a:t>
             </a:r>
             <a:endParaRPr lang="en-US" altLang="en-US" sz="3600"/>
           </a:p>
@@ -3968,7 +3983,7 @@
         <p:spPr>
           <a:xfrm>
             <a:off x="332740" y="135255"/>
-            <a:ext cx="9116695" cy="645160"/>
+            <a:ext cx="9268460" cy="645160"/>
           </a:xfrm>
           <a:prstGeom prst="rect">
             <a:avLst/>
@@ -4042,7 +4057,7 @@
         <p:spPr>
           <a:xfrm>
             <a:off x="332740" y="135255"/>
-            <a:ext cx="9268460" cy="645160"/>
+            <a:ext cx="9471660" cy="645160"/>
           </a:xfrm>
           <a:prstGeom prst="rect">
             <a:avLst/>
@@ -4054,11 +4069,18 @@
             <a:spAutoFit/>
           </a:bodyPr>
           <a:p>
+            <a:pPr marL="80010" indent="0" fontAlgn="auto">
+              <a:spcBef>
+                <a:spcPts val="3000"/>
+              </a:spcBef>
+              <a:buFont typeface="Arial" panose="02080604020202020204" pitchFamily="34" charset="0"/>
+              <a:buNone/>
+            </a:pPr>
             <a:r>
               <a:rPr lang="en-US" altLang="en-US" sz="3600">
                 <a:sym typeface="+mn-ea"/>
               </a:rPr>
-              <a:t>The momentum magnitude of beam</a:t>
+              <a:t>Angular distribution of recoiled proton</a:t>
             </a:r>
             <a:endParaRPr lang="en-US" altLang="en-US" sz="3600"/>
           </a:p>
@@ -4116,7 +4138,7 @@
         <p:spPr>
           <a:xfrm>
             <a:off x="332740" y="135255"/>
-            <a:ext cx="8001000" cy="645160"/>
+            <a:ext cx="9336405" cy="645160"/>
           </a:xfrm>
           <a:prstGeom prst="rect">
             <a:avLst/>
@@ -4132,20 +4154,14 @@
               <a:spcBef>
                 <a:spcPts val="3000"/>
               </a:spcBef>
-              <a:buFont typeface="Arial" panose="020B0604020202020204" pitchFamily="34" charset="0"/>
+              <a:buFont typeface="Arial" panose="02080604020202020204" pitchFamily="34" charset="0"/>
               <a:buNone/>
             </a:pPr>
             <a:r>
               <a:rPr lang="en-US" altLang="en-US" sz="3600">
                 <a:sym typeface="+mn-ea"/>
               </a:rPr>
-              <a:t>Angular distribution of </a:t>
-            </a:r>
-            <a:r>
-              <a:rPr lang="en-US" altLang="en-US" sz="3600">
-                <a:sym typeface="+mn-ea"/>
-              </a:rPr>
-              <a:t>recoiled proton</a:t>
+              <a:t>Angular distribution of recoiled proton</a:t>
             </a:r>
             <a:endParaRPr lang="en-US" altLang="en-US" sz="3600"/>
           </a:p>
@@ -4203,7 +4219,7 @@
         <p:spPr>
           <a:xfrm>
             <a:off x="332740" y="135255"/>
-            <a:ext cx="9336405" cy="645160"/>
+            <a:ext cx="4641215" cy="645160"/>
           </a:xfrm>
           <a:prstGeom prst="rect">
             <a:avLst/>
@@ -4215,24 +4231,9 @@
             <a:spAutoFit/>
           </a:bodyPr>
           <a:p>
-            <a:pPr marL="80010" indent="0" fontAlgn="auto">
-              <a:spcBef>
-                <a:spcPts val="3000"/>
-              </a:spcBef>
-              <a:buFont typeface="Arial" panose="020B0604020202020204" pitchFamily="34" charset="0"/>
-              <a:buNone/>
-            </a:pPr>
-            <a:r>
-              <a:rPr lang="en-US" altLang="en-US" sz="3600">
-                <a:sym typeface="+mn-ea"/>
-              </a:rPr>
-              <a:t>Angular distribution of </a:t>
-            </a:r>
-            <a:r>
-              <a:rPr lang="en-US" altLang="en-US" sz="3600">
-                <a:sym typeface="+mn-ea"/>
-              </a:rPr>
-              <a:t>recoiled proton</a:t>
+            <a:r>
+              <a:rPr lang="en-US" altLang="en-US" sz="3600"/>
+              <a:t>Summary</a:t>
             </a:r>
             <a:endParaRPr lang="en-US" altLang="en-US" sz="3600"/>
           </a:p>
@@ -4290,7 +4291,7 @@
         <p:spPr>
           <a:xfrm>
             <a:off x="332740" y="135255"/>
-            <a:ext cx="4641215" cy="645160"/>
+            <a:ext cx="7091045" cy="645160"/>
           </a:xfrm>
           <a:prstGeom prst="rect">
             <a:avLst/>
@@ -4303,82 +4304,10 @@
           </a:bodyPr>
           <a:p>
             <a:r>
-              <a:rPr lang="" altLang="en-US" sz="3600"/>
+              <a:rPr lang="en-US" altLang="en-US" sz="3600"/>
               <a:t>The goals of analysis</a:t>
             </a:r>
-            <a:endParaRPr lang="" altLang="en-US" sz="3600"/>
-          </a:p>
-        </p:txBody>
-      </p:sp>
-    </p:spTree>
-  </p:cSld>
-  <p:clrMapOvr>
-    <a:masterClrMapping/>
-  </p:clrMapOvr>
-</p:sld>
-</file>
-
-<file path=ppt/slides/slide20.xml><?xml version="1.0" encoding="utf-8"?>
-<p:sld xmlns:a="http://schemas.openxmlformats.org/drawingml/2006/main" xmlns:r="http://schemas.openxmlformats.org/officeDocument/2006/relationships" xmlns:p="http://schemas.openxmlformats.org/presentationml/2006/main">
-  <p:cSld>
-    <p:spTree>
-      <p:nvGrpSpPr>
-        <p:cNvPr id="1" name=""/>
-        <p:cNvGrpSpPr/>
-        <p:nvPr/>
-      </p:nvGrpSpPr>
-      <p:grpSpPr/>
-      <p:sp>
-        <p:nvSpPr>
-          <p:cNvPr id="2" name="Slide Number Placeholder 1"/>
-          <p:cNvSpPr>
-            <a:spLocks noGrp="1"/>
-          </p:cNvSpPr>
-          <p:nvPr>
-            <p:ph type="sldNum" sz="quarter" idx="12"/>
-          </p:nvPr>
-        </p:nvSpPr>
-        <p:spPr/>
-        <p:txBody>
-          <a:bodyPr/>
-          <a:p>
-            <a:r>
-              <a:rPr lang="en-US" altLang="zh-CN" smtClean="0"/>
-              <a:t> </a:t>
-            </a:r>
-            <a:fld id="{565CE74E-AB26-4998-AD42-012C4C1AD076}" type="slidenum">
-              <a:rPr lang="zh-CN" altLang="en-US" smtClean="0"/>
-            </a:fld>
-            <a:endParaRPr lang="en-US" altLang="zh-CN" smtClean="0"/>
-          </a:p>
-        </p:txBody>
-      </p:sp>
-      <p:sp>
-        <p:nvSpPr>
-          <p:cNvPr id="3" name="Text Box 2"/>
-          <p:cNvSpPr txBox="1"/>
-          <p:nvPr/>
-        </p:nvSpPr>
-        <p:spPr>
-          <a:xfrm>
-            <a:off x="332740" y="135255"/>
-            <a:ext cx="4641215" cy="645160"/>
-          </a:xfrm>
-          <a:prstGeom prst="rect">
-            <a:avLst/>
-          </a:prstGeom>
-          <a:noFill/>
-        </p:spPr>
-        <p:txBody>
-          <a:bodyPr wrap="square" rtlCol="0">
-            <a:spAutoFit/>
-          </a:bodyPr>
-          <a:p>
-            <a:r>
-              <a:rPr lang="" altLang="en-US" sz="3600"/>
-              <a:t>Summary</a:t>
-            </a:r>
-            <a:endParaRPr lang="" altLang="en-US" sz="3600"/>
+            <a:endParaRPr lang="en-US" altLang="en-US" sz="3600"/>
           </a:p>
         </p:txBody>
       </p:sp>
@@ -4434,7 +4363,7 @@
         <p:spPr>
           <a:xfrm>
             <a:off x="332740" y="135255"/>
-            <a:ext cx="4641215" cy="645160"/>
+            <a:ext cx="9653905" cy="645160"/>
           </a:xfrm>
           <a:prstGeom prst="rect">
             <a:avLst/>
@@ -4447,10 +4376,10 @@
           </a:bodyPr>
           <a:p>
             <a:r>
-              <a:rPr lang="" altLang="en-US" sz="3600"/>
-              <a:t>COMPASS</a:t>
-            </a:r>
-            <a:endParaRPr lang="" altLang="en-US" sz="3600"/>
+              <a:rPr lang="en-US" altLang="en-US" sz="3600"/>
+              <a:t>Detector Layout</a:t>
+            </a:r>
+            <a:endParaRPr lang="en-US" altLang="en-US" sz="3600"/>
           </a:p>
         </p:txBody>
       </p:sp>
@@ -4506,7 +4435,7 @@
         <p:spPr>
           <a:xfrm>
             <a:off x="332740" y="135255"/>
-            <a:ext cx="9653905" cy="645160"/>
+            <a:ext cx="8442325" cy="645160"/>
           </a:xfrm>
           <a:prstGeom prst="rect">
             <a:avLst/>
@@ -4519,10 +4448,10 @@
           </a:bodyPr>
           <a:p>
             <a:r>
-              <a:rPr lang="" altLang="en-US" sz="3600"/>
-              <a:t>Detector Layout</a:t>
-            </a:r>
-            <a:endParaRPr lang="" altLang="en-US" sz="3600"/>
+              <a:rPr lang="en-US" altLang="en-US" sz="3600"/>
+              <a:t>Datasets and pre-selection:</a:t>
+            </a:r>
+            <a:endParaRPr lang="en-US" altLang="en-US" sz="3600"/>
           </a:p>
         </p:txBody>
       </p:sp>
@@ -4591,10 +4520,10 @@
           </a:bodyPr>
           <a:p>
             <a:r>
-              <a:rPr lang="" altLang="en-US" sz="3600"/>
+              <a:rPr lang="en-US" altLang="en-US" sz="3600"/>
               <a:t>the scheme of scattering process</a:t>
             </a:r>
-            <a:endParaRPr lang="" altLang="en-US" sz="3600"/>
+            <a:endParaRPr lang="en-US" altLang="en-US" sz="3600"/>
           </a:p>
         </p:txBody>
       </p:sp>
@@ -4650,7 +4579,7 @@
         <p:spPr>
           <a:xfrm>
             <a:off x="332740" y="135255"/>
-            <a:ext cx="8442325" cy="645160"/>
+            <a:ext cx="8359140" cy="645160"/>
           </a:xfrm>
           <a:prstGeom prst="rect">
             <a:avLst/>
@@ -4663,10 +4592,10 @@
           </a:bodyPr>
           <a:p>
             <a:r>
-              <a:rPr lang="" altLang="en-US" sz="3600"/>
-              <a:t>Datasets and pre-selection:</a:t>
-            </a:r>
-            <a:endParaRPr lang="" altLang="en-US" sz="3600"/>
+              <a:rPr lang="en-US" altLang="en-US" sz="3600"/>
+              <a:t>Overlook of event distribution </a:t>
+            </a:r>
+            <a:endParaRPr lang="en-US" altLang="en-US" sz="3600"/>
           </a:p>
         </p:txBody>
       </p:sp>
@@ -4722,7 +4651,7 @@
         <p:spPr>
           <a:xfrm>
             <a:off x="332740" y="135255"/>
-            <a:ext cx="8359140" cy="645160"/>
+            <a:ext cx="8482965" cy="645160"/>
           </a:xfrm>
           <a:prstGeom prst="rect">
             <a:avLst/>
@@ -4735,10 +4664,126 @@
           </a:bodyPr>
           <a:p>
             <a:r>
-              <a:rPr lang="" altLang="en-US" sz="3600"/>
-              <a:t>Overlook of event distribution </a:t>
-            </a:r>
-            <a:endParaRPr lang="" altLang="en-US" sz="3600"/>
+              <a:rPr lang="en-US" altLang="en-US" sz="3600"/>
+              <a:t>Parameters investigated </a:t>
+            </a:r>
+            <a:endParaRPr lang="en-US" altLang="en-US" sz="3600"/>
+          </a:p>
+        </p:txBody>
+      </p:sp>
+      <p:sp>
+        <p:nvSpPr>
+          <p:cNvPr id="4" name="Text Box 3"/>
+          <p:cNvSpPr txBox="1"/>
+          <p:nvPr/>
+        </p:nvSpPr>
+        <p:spPr>
+          <a:xfrm>
+            <a:off x="123190" y="1238885"/>
+            <a:ext cx="11581765" cy="4599940"/>
+          </a:xfrm>
+          <a:prstGeom prst="rect">
+            <a:avLst/>
+          </a:prstGeom>
+          <a:noFill/>
+        </p:spPr>
+        <p:txBody>
+          <a:bodyPr wrap="square" rtlCol="0">
+            <a:spAutoFit/>
+          </a:bodyPr>
+          <a:p>
+            <a:pPr marL="365760" indent="-285750" fontAlgn="auto">
+              <a:spcBef>
+                <a:spcPts val="3000"/>
+              </a:spcBef>
+              <a:buFont typeface="Arial" panose="02080604020202020204" pitchFamily="34" charset="0"/>
+              <a:buChar char="•"/>
+            </a:pPr>
+            <a:r>
+              <a:rPr lang="en-US" altLang="en-US" sz="2800"/>
+              <a:t>The total invariant mass (Three pions + photons)</a:t>
+            </a:r>
+            <a:endParaRPr lang="en-US" altLang="en-US" sz="2800"/>
+          </a:p>
+          <a:p>
+            <a:pPr marL="365760" indent="-285750" fontAlgn="auto">
+              <a:spcBef>
+                <a:spcPts val="3000"/>
+              </a:spcBef>
+              <a:buFont typeface="Arial" panose="02080604020202020204" pitchFamily="34" charset="0"/>
+              <a:buChar char="•"/>
+            </a:pPr>
+            <a:r>
+              <a:rPr lang="en-US" altLang="en-US" sz="2800">
+                <a:sym typeface="+mn-ea"/>
+              </a:rPr>
+              <a:t>Invariant mass of three pions</a:t>
+            </a:r>
+            <a:endParaRPr lang="en-US" altLang="en-US" sz="2800"/>
+          </a:p>
+          <a:p>
+            <a:pPr marL="365760" indent="-285750" fontAlgn="auto">
+              <a:spcBef>
+                <a:spcPts val="3000"/>
+              </a:spcBef>
+              <a:buFont typeface="Arial" panose="02080604020202020204" pitchFamily="34" charset="0"/>
+              <a:buChar char="•"/>
+            </a:pPr>
+            <a:r>
+              <a:rPr lang="en-US" altLang="en-US" sz="2800">
+                <a:sym typeface="+mn-ea"/>
+              </a:rPr>
+              <a:t>Photon number from different Calorimeters</a:t>
+            </a:r>
+            <a:endParaRPr lang="en-US" altLang="en-US" sz="2800"/>
+          </a:p>
+          <a:p>
+            <a:pPr marL="365760" indent="-285750" fontAlgn="auto">
+              <a:spcBef>
+                <a:spcPts val="3000"/>
+              </a:spcBef>
+              <a:buFont typeface="Arial" panose="02080604020202020204" pitchFamily="34" charset="0"/>
+              <a:buChar char="•"/>
+            </a:pPr>
+            <a:r>
+              <a:rPr lang="en-US" altLang="en-US" sz="2800"/>
+              <a:t>Position of Vertices</a:t>
+            </a:r>
+            <a:endParaRPr lang="en-US" altLang="en-US" sz="2800"/>
+          </a:p>
+          <a:p>
+            <a:pPr marL="365760" indent="-285750" fontAlgn="auto">
+              <a:spcBef>
+                <a:spcPts val="3000"/>
+              </a:spcBef>
+              <a:buFont typeface="Arial" panose="02080604020202020204" pitchFamily="34" charset="0"/>
+              <a:buChar char="•"/>
+            </a:pPr>
+            <a:r>
+              <a:rPr lang="en-US" altLang="en-US" sz="2800"/>
+              <a:t>The momentum magnitude of beam</a:t>
+            </a:r>
+            <a:endParaRPr lang="en-US" altLang="en-US" sz="2800"/>
+          </a:p>
+          <a:p>
+            <a:pPr marL="365760" indent="-285750" fontAlgn="auto">
+              <a:spcBef>
+                <a:spcPts val="3000"/>
+              </a:spcBef>
+              <a:buFont typeface="Arial" panose="02080604020202020204" pitchFamily="34" charset="0"/>
+              <a:buChar char="•"/>
+            </a:pPr>
+            <a:r>
+              <a:rPr lang="en-US" altLang="en-US" sz="2800"/>
+              <a:t>Angular distribution of </a:t>
+            </a:r>
+            <a:r>
+              <a:rPr lang="en-US" altLang="en-US" sz="2800">
+                <a:sym typeface="+mn-ea"/>
+              </a:rPr>
+              <a:t>recoiled proton</a:t>
+            </a:r>
+            <a:endParaRPr lang="en-US" altLang="en-US" sz="2800"/>
           </a:p>
         </p:txBody>
       </p:sp>
@@ -4794,7 +4839,7 @@
         <p:spPr>
           <a:xfrm>
             <a:off x="332740" y="135255"/>
-            <a:ext cx="8482965" cy="645160"/>
+            <a:ext cx="5963285" cy="645160"/>
           </a:xfrm>
           <a:prstGeom prst="rect">
             <a:avLst/>
@@ -4807,126 +4852,12 @@
           </a:bodyPr>
           <a:p>
             <a:r>
-              <a:rPr lang="" altLang="en-US" sz="3600"/>
-              <a:t>Parameters investigated </a:t>
-            </a:r>
-            <a:endParaRPr lang="" altLang="en-US" sz="3600"/>
-          </a:p>
-        </p:txBody>
-      </p:sp>
-      <p:sp>
-        <p:nvSpPr>
-          <p:cNvPr id="4" name="Text Box 3"/>
-          <p:cNvSpPr txBox="1"/>
-          <p:nvPr/>
-        </p:nvSpPr>
-        <p:spPr>
-          <a:xfrm>
-            <a:off x="123190" y="1238885"/>
-            <a:ext cx="11581765" cy="4599940"/>
-          </a:xfrm>
-          <a:prstGeom prst="rect">
-            <a:avLst/>
-          </a:prstGeom>
-          <a:noFill/>
-        </p:spPr>
-        <p:txBody>
-          <a:bodyPr wrap="square" rtlCol="0">
-            <a:spAutoFit/>
-          </a:bodyPr>
-          <a:p>
-            <a:pPr marL="365760" indent="-285750" fontAlgn="auto">
-              <a:spcBef>
-                <a:spcPts val="3000"/>
-              </a:spcBef>
-              <a:buFont typeface="Arial" panose="020B0604020202020204" pitchFamily="34" charset="0"/>
-              <a:buChar char="•"/>
-            </a:pPr>
-            <a:r>
-              <a:rPr lang="" altLang="en-US" sz="2800"/>
-              <a:t>The total invariant mass (Three pions + photons)</a:t>
-            </a:r>
-            <a:endParaRPr lang="" altLang="en-US" sz="2800"/>
-          </a:p>
-          <a:p>
-            <a:pPr marL="365760" indent="-285750" fontAlgn="auto">
-              <a:spcBef>
-                <a:spcPts val="3000"/>
-              </a:spcBef>
-              <a:buFont typeface="Arial" panose="020B0604020202020204" pitchFamily="34" charset="0"/>
-              <a:buChar char="•"/>
-            </a:pPr>
-            <a:r>
-              <a:rPr lang="en-US" altLang="en-US" sz="2800">
+              <a:rPr lang="en-US" altLang="en-US" sz="3600">
                 <a:sym typeface="+mn-ea"/>
               </a:rPr>
-              <a:t>Invariant mass of three pions</a:t>
-            </a:r>
-            <a:endParaRPr lang="" altLang="en-US" sz="2800"/>
-          </a:p>
-          <a:p>
-            <a:pPr marL="365760" indent="-285750" fontAlgn="auto">
-              <a:spcBef>
-                <a:spcPts val="3000"/>
-              </a:spcBef>
-              <a:buFont typeface="Arial" panose="020B0604020202020204" pitchFamily="34" charset="0"/>
-              <a:buChar char="•"/>
-            </a:pPr>
-            <a:r>
-              <a:rPr lang="en-US" altLang="en-US" sz="2800">
-                <a:sym typeface="+mn-ea"/>
-              </a:rPr>
-              <a:t>Photon number from different Calorimeters</a:t>
-            </a:r>
-            <a:endParaRPr lang="" altLang="en-US" sz="2800"/>
-          </a:p>
-          <a:p>
-            <a:pPr marL="365760" indent="-285750" fontAlgn="auto">
-              <a:spcBef>
-                <a:spcPts val="3000"/>
-              </a:spcBef>
-              <a:buFont typeface="Arial" panose="020B0604020202020204" pitchFamily="34" charset="0"/>
-              <a:buChar char="•"/>
-            </a:pPr>
-            <a:r>
-              <a:rPr lang="" altLang="en-US" sz="2800"/>
-              <a:t>Position of Vertices</a:t>
-            </a:r>
-            <a:endParaRPr lang="" altLang="en-US" sz="2800"/>
-          </a:p>
-          <a:p>
-            <a:pPr marL="365760" indent="-285750" fontAlgn="auto">
-              <a:spcBef>
-                <a:spcPts val="3000"/>
-              </a:spcBef>
-              <a:buFont typeface="Arial" panose="020B0604020202020204" pitchFamily="34" charset="0"/>
-              <a:buChar char="•"/>
-            </a:pPr>
-            <a:r>
-              <a:rPr lang="" altLang="en-US" sz="2800"/>
-              <a:t>The momentum magnitude of beam</a:t>
-            </a:r>
-            <a:endParaRPr lang="" altLang="en-US" sz="2800"/>
-          </a:p>
-          <a:p>
-            <a:pPr marL="365760" indent="-285750" fontAlgn="auto">
-              <a:spcBef>
-                <a:spcPts val="3000"/>
-              </a:spcBef>
-              <a:buFont typeface="Arial" panose="020B0604020202020204" pitchFamily="34" charset="0"/>
-              <a:buChar char="•"/>
-            </a:pPr>
-            <a:r>
-              <a:rPr lang="" altLang="en-US" sz="2800"/>
-              <a:t>Angular distribution of </a:t>
-            </a:r>
-            <a:r>
-              <a:rPr lang="en-US" altLang="en-US" sz="2800">
-                <a:sym typeface="+mn-ea"/>
-              </a:rPr>
-              <a:t>recoiled proton</a:t>
-            </a:r>
-            <a:endParaRPr lang="" altLang="en-US" sz="2800"/>
+              <a:t>The total invariant mass</a:t>
+            </a:r>
+            <a:endParaRPr lang="en-US" altLang="en-US" sz="3600"/>
           </a:p>
         </p:txBody>
       </p:sp>
@@ -4982,7 +4913,7 @@
         <p:spPr>
           <a:xfrm>
             <a:off x="332740" y="135255"/>
-            <a:ext cx="5963285" cy="645160"/>
+            <a:ext cx="6003925" cy="645160"/>
           </a:xfrm>
           <a:prstGeom prst="rect">
             <a:avLst/>

</xml_diff>